<commit_message>
Pasta com os instaladores para windows.
</commit_message>
<xml_diff>
--- a/GDP GameArt.pptx
+++ b/GDP GameArt.pptx
@@ -17,6 +17,8 @@
     <p:sldId id="262" r:id="rId12"/>
     <p:sldId id="263" r:id="rId13"/>
     <p:sldId id="264" r:id="rId14"/>
+    <p:sldId id="265" r:id="rId15"/>
+    <p:sldId id="266" r:id="rId16"/>
   </p:sldIdLst>
   <p:sldSz cy="5143500" cx="9144000"/>
   <p:notesSz cx="6858000" cy="9144000"/>
@@ -488,12 +490,12 @@
 </p:notes>
 </file>
 
-<file path=ppt/notesSlides/notesSlide2.xml><?xml version="1.0" encoding="utf-8"?>
+<file path=ppt/notesSlides/notesSlide10.xml><?xml version="1.0" encoding="utf-8"?>
 <p:notes xmlns:a="http://schemas.openxmlformats.org/drawingml/2006/main" xmlns:r="http://schemas.openxmlformats.org/officeDocument/2006/relationships" xmlns:mc="http://schemas.openxmlformats.org/markup-compatibility/2006" xmlns:mv="urn:schemas-microsoft-com:mac:vml" xmlns:p="http://schemas.openxmlformats.org/presentationml/2006/main" xmlns:c="http://schemas.openxmlformats.org/drawingml/2006/chart" xmlns:dgm="http://schemas.openxmlformats.org/drawingml/2006/diagram" xmlns:o="urn:schemas-microsoft-com:office:office" xmlns:v="urn:schemas-microsoft-com:vml" xmlns:pvml="urn:schemas-microsoft-com:office:powerpoint" xmlns:com="http://schemas.openxmlformats.org/drawingml/2006/compatibility" xmlns:p14="http://schemas.microsoft.com/office/powerpoint/2010/main" showMasterPhAnim="0" showMasterSp="0">
   <p:cSld>
     <p:spTree>
       <p:nvGrpSpPr>
-        <p:cNvPr id="45" name="Shape 45"/>
+        <p:cNvPr id="98" name="Shape 98"/>
         <p:cNvGrpSpPr/>
         <p:nvPr/>
       </p:nvGrpSpPr>
@@ -507,7 +509,7 @@
       </p:grpSpPr>
       <p:sp>
         <p:nvSpPr>
-          <p:cNvPr id="46" name="Shape 46"/>
+          <p:cNvPr id="99" name="Shape 99"/>
           <p:cNvSpPr/>
           <p:nvPr>
             <p:ph idx="2" type="sldImg"/>
@@ -551,7 +553,7 @@
       </p:sp>
       <p:sp>
         <p:nvSpPr>
-          <p:cNvPr id="47" name="Shape 47"/>
+          <p:cNvPr id="100" name="Shape 100"/>
           <p:cNvSpPr txBox="1"/>
           <p:nvPr>
             <p:ph idx="1" type="body"/>
@@ -593,12 +595,12 @@
 </p:notes>
 </file>
 
-<file path=ppt/notesSlides/notesSlide3.xml><?xml version="1.0" encoding="utf-8"?>
+<file path=ppt/notesSlides/notesSlide11.xml><?xml version="1.0" encoding="utf-8"?>
 <p:notes xmlns:a="http://schemas.openxmlformats.org/drawingml/2006/main" xmlns:r="http://schemas.openxmlformats.org/officeDocument/2006/relationships" xmlns:mc="http://schemas.openxmlformats.org/markup-compatibility/2006" xmlns:mv="urn:schemas-microsoft-com:mac:vml" xmlns:p="http://schemas.openxmlformats.org/presentationml/2006/main" xmlns:c="http://schemas.openxmlformats.org/drawingml/2006/chart" xmlns:dgm="http://schemas.openxmlformats.org/drawingml/2006/diagram" xmlns:o="urn:schemas-microsoft-com:office:office" xmlns:v="urn:schemas-microsoft-com:vml" xmlns:pvml="urn:schemas-microsoft-com:office:powerpoint" xmlns:com="http://schemas.openxmlformats.org/drawingml/2006/compatibility" xmlns:p14="http://schemas.microsoft.com/office/powerpoint/2010/main" showMasterPhAnim="0" showMasterSp="0">
   <p:cSld>
     <p:spTree>
       <p:nvGrpSpPr>
-        <p:cNvPr id="51" name="Shape 51"/>
+        <p:cNvPr id="104" name="Shape 104"/>
         <p:cNvGrpSpPr/>
         <p:nvPr/>
       </p:nvGrpSpPr>
@@ -612,7 +614,7 @@
       </p:grpSpPr>
       <p:sp>
         <p:nvSpPr>
-          <p:cNvPr id="52" name="Shape 52"/>
+          <p:cNvPr id="105" name="Shape 105"/>
           <p:cNvSpPr/>
           <p:nvPr>
             <p:ph idx="2" type="sldImg"/>
@@ -656,7 +658,7 @@
       </p:sp>
       <p:sp>
         <p:nvSpPr>
-          <p:cNvPr id="53" name="Shape 53"/>
+          <p:cNvPr id="106" name="Shape 106"/>
           <p:cNvSpPr txBox="1"/>
           <p:nvPr>
             <p:ph idx="1" type="body"/>
@@ -698,12 +700,12 @@
 </p:notes>
 </file>
 
-<file path=ppt/notesSlides/notesSlide4.xml><?xml version="1.0" encoding="utf-8"?>
+<file path=ppt/notesSlides/notesSlide2.xml><?xml version="1.0" encoding="utf-8"?>
 <p:notes xmlns:a="http://schemas.openxmlformats.org/drawingml/2006/main" xmlns:r="http://schemas.openxmlformats.org/officeDocument/2006/relationships" xmlns:mc="http://schemas.openxmlformats.org/markup-compatibility/2006" xmlns:mv="urn:schemas-microsoft-com:mac:vml" xmlns:p="http://schemas.openxmlformats.org/presentationml/2006/main" xmlns:c="http://schemas.openxmlformats.org/drawingml/2006/chart" xmlns:dgm="http://schemas.openxmlformats.org/drawingml/2006/diagram" xmlns:o="urn:schemas-microsoft-com:office:office" xmlns:v="urn:schemas-microsoft-com:vml" xmlns:pvml="urn:schemas-microsoft-com:office:powerpoint" xmlns:com="http://schemas.openxmlformats.org/drawingml/2006/compatibility" xmlns:p14="http://schemas.microsoft.com/office/powerpoint/2010/main" showMasterPhAnim="0" showMasterSp="0">
   <p:cSld>
     <p:spTree>
       <p:nvGrpSpPr>
-        <p:cNvPr id="58" name="Shape 58"/>
+        <p:cNvPr id="45" name="Shape 45"/>
         <p:cNvGrpSpPr/>
         <p:nvPr/>
       </p:nvGrpSpPr>
@@ -717,7 +719,7 @@
       </p:grpSpPr>
       <p:sp>
         <p:nvSpPr>
-          <p:cNvPr id="59" name="Shape 59"/>
+          <p:cNvPr id="46" name="Shape 46"/>
           <p:cNvSpPr/>
           <p:nvPr>
             <p:ph idx="2" type="sldImg"/>
@@ -761,7 +763,7 @@
       </p:sp>
       <p:sp>
         <p:nvSpPr>
-          <p:cNvPr id="60" name="Shape 60"/>
+          <p:cNvPr id="47" name="Shape 47"/>
           <p:cNvSpPr txBox="1"/>
           <p:nvPr>
             <p:ph idx="1" type="body"/>
@@ -803,12 +805,12 @@
 </p:notes>
 </file>
 
-<file path=ppt/notesSlides/notesSlide5.xml><?xml version="1.0" encoding="utf-8"?>
+<file path=ppt/notesSlides/notesSlide3.xml><?xml version="1.0" encoding="utf-8"?>
 <p:notes xmlns:a="http://schemas.openxmlformats.org/drawingml/2006/main" xmlns:r="http://schemas.openxmlformats.org/officeDocument/2006/relationships" xmlns:mc="http://schemas.openxmlformats.org/markup-compatibility/2006" xmlns:mv="urn:schemas-microsoft-com:mac:vml" xmlns:p="http://schemas.openxmlformats.org/presentationml/2006/main" xmlns:c="http://schemas.openxmlformats.org/drawingml/2006/chart" xmlns:dgm="http://schemas.openxmlformats.org/drawingml/2006/diagram" xmlns:o="urn:schemas-microsoft-com:office:office" xmlns:v="urn:schemas-microsoft-com:vml" xmlns:pvml="urn:schemas-microsoft-com:office:powerpoint" xmlns:com="http://schemas.openxmlformats.org/drawingml/2006/compatibility" xmlns:p14="http://schemas.microsoft.com/office/powerpoint/2010/main" showMasterPhAnim="0" showMasterSp="0">
   <p:cSld>
     <p:spTree>
       <p:nvGrpSpPr>
-        <p:cNvPr id="64" name="Shape 64"/>
+        <p:cNvPr id="51" name="Shape 51"/>
         <p:cNvGrpSpPr/>
         <p:nvPr/>
       </p:nvGrpSpPr>
@@ -822,7 +824,7 @@
       </p:grpSpPr>
       <p:sp>
         <p:nvSpPr>
-          <p:cNvPr id="65" name="Shape 65"/>
+          <p:cNvPr id="52" name="Shape 52"/>
           <p:cNvSpPr/>
           <p:nvPr>
             <p:ph idx="2" type="sldImg"/>
@@ -866,7 +868,7 @@
       </p:sp>
       <p:sp>
         <p:nvSpPr>
-          <p:cNvPr id="66" name="Shape 66"/>
+          <p:cNvPr id="53" name="Shape 53"/>
           <p:cNvSpPr txBox="1"/>
           <p:nvPr>
             <p:ph idx="1" type="body"/>
@@ -908,12 +910,12 @@
 </p:notes>
 </file>
 
-<file path=ppt/notesSlides/notesSlide6.xml><?xml version="1.0" encoding="utf-8"?>
+<file path=ppt/notesSlides/notesSlide4.xml><?xml version="1.0" encoding="utf-8"?>
 <p:notes xmlns:a="http://schemas.openxmlformats.org/drawingml/2006/main" xmlns:r="http://schemas.openxmlformats.org/officeDocument/2006/relationships" xmlns:mc="http://schemas.openxmlformats.org/markup-compatibility/2006" xmlns:mv="urn:schemas-microsoft-com:mac:vml" xmlns:p="http://schemas.openxmlformats.org/presentationml/2006/main" xmlns:c="http://schemas.openxmlformats.org/drawingml/2006/chart" xmlns:dgm="http://schemas.openxmlformats.org/drawingml/2006/diagram" xmlns:o="urn:schemas-microsoft-com:office:office" xmlns:v="urn:schemas-microsoft-com:vml" xmlns:pvml="urn:schemas-microsoft-com:office:powerpoint" xmlns:com="http://schemas.openxmlformats.org/drawingml/2006/compatibility" xmlns:p14="http://schemas.microsoft.com/office/powerpoint/2010/main" showMasterPhAnim="0" showMasterSp="0">
   <p:cSld>
     <p:spTree>
       <p:nvGrpSpPr>
-        <p:cNvPr id="72" name="Shape 72"/>
+        <p:cNvPr id="58" name="Shape 58"/>
         <p:cNvGrpSpPr/>
         <p:nvPr/>
       </p:nvGrpSpPr>
@@ -927,7 +929,7 @@
       </p:grpSpPr>
       <p:sp>
         <p:nvSpPr>
-          <p:cNvPr id="73" name="Shape 73"/>
+          <p:cNvPr id="59" name="Shape 59"/>
           <p:cNvSpPr/>
           <p:nvPr>
             <p:ph idx="2" type="sldImg"/>
@@ -971,7 +973,7 @@
       </p:sp>
       <p:sp>
         <p:nvSpPr>
-          <p:cNvPr id="74" name="Shape 74"/>
+          <p:cNvPr id="60" name="Shape 60"/>
           <p:cNvSpPr txBox="1"/>
           <p:nvPr>
             <p:ph idx="1" type="body"/>
@@ -1013,12 +1015,12 @@
 </p:notes>
 </file>
 
-<file path=ppt/notesSlides/notesSlide7.xml><?xml version="1.0" encoding="utf-8"?>
+<file path=ppt/notesSlides/notesSlide5.xml><?xml version="1.0" encoding="utf-8"?>
 <p:notes xmlns:a="http://schemas.openxmlformats.org/drawingml/2006/main" xmlns:r="http://schemas.openxmlformats.org/officeDocument/2006/relationships" xmlns:mc="http://schemas.openxmlformats.org/markup-compatibility/2006" xmlns:mv="urn:schemas-microsoft-com:mac:vml" xmlns:p="http://schemas.openxmlformats.org/presentationml/2006/main" xmlns:c="http://schemas.openxmlformats.org/drawingml/2006/chart" xmlns:dgm="http://schemas.openxmlformats.org/drawingml/2006/diagram" xmlns:o="urn:schemas-microsoft-com:office:office" xmlns:v="urn:schemas-microsoft-com:vml" xmlns:pvml="urn:schemas-microsoft-com:office:powerpoint" xmlns:com="http://schemas.openxmlformats.org/drawingml/2006/compatibility" xmlns:p14="http://schemas.microsoft.com/office/powerpoint/2010/main" showMasterPhAnim="0" showMasterSp="0">
   <p:cSld>
     <p:spTree>
       <p:nvGrpSpPr>
-        <p:cNvPr id="78" name="Shape 78"/>
+        <p:cNvPr id="64" name="Shape 64"/>
         <p:cNvGrpSpPr/>
         <p:nvPr/>
       </p:nvGrpSpPr>
@@ -1032,7 +1034,7 @@
       </p:grpSpPr>
       <p:sp>
         <p:nvSpPr>
-          <p:cNvPr id="79" name="Shape 79"/>
+          <p:cNvPr id="65" name="Shape 65"/>
           <p:cNvSpPr/>
           <p:nvPr>
             <p:ph idx="2" type="sldImg"/>
@@ -1076,7 +1078,7 @@
       </p:sp>
       <p:sp>
         <p:nvSpPr>
-          <p:cNvPr id="80" name="Shape 80"/>
+          <p:cNvPr id="66" name="Shape 66"/>
           <p:cNvSpPr txBox="1"/>
           <p:nvPr>
             <p:ph idx="1" type="body"/>
@@ -1118,12 +1120,12 @@
 </p:notes>
 </file>
 
-<file path=ppt/notesSlides/notesSlide8.xml><?xml version="1.0" encoding="utf-8"?>
+<file path=ppt/notesSlides/notesSlide6.xml><?xml version="1.0" encoding="utf-8"?>
 <p:notes xmlns:a="http://schemas.openxmlformats.org/drawingml/2006/main" xmlns:r="http://schemas.openxmlformats.org/officeDocument/2006/relationships" xmlns:mc="http://schemas.openxmlformats.org/markup-compatibility/2006" xmlns:mv="urn:schemas-microsoft-com:mac:vml" xmlns:p="http://schemas.openxmlformats.org/presentationml/2006/main" xmlns:c="http://schemas.openxmlformats.org/drawingml/2006/chart" xmlns:dgm="http://schemas.openxmlformats.org/drawingml/2006/diagram" xmlns:o="urn:schemas-microsoft-com:office:office" xmlns:v="urn:schemas-microsoft-com:vml" xmlns:pvml="urn:schemas-microsoft-com:office:powerpoint" xmlns:com="http://schemas.openxmlformats.org/drawingml/2006/compatibility" xmlns:p14="http://schemas.microsoft.com/office/powerpoint/2010/main" showMasterPhAnim="0" showMasterSp="0">
   <p:cSld>
     <p:spTree>
       <p:nvGrpSpPr>
-        <p:cNvPr id="86" name="Shape 86"/>
+        <p:cNvPr id="72" name="Shape 72"/>
         <p:cNvGrpSpPr/>
         <p:nvPr/>
       </p:nvGrpSpPr>
@@ -1137,7 +1139,7 @@
       </p:grpSpPr>
       <p:sp>
         <p:nvSpPr>
-          <p:cNvPr id="87" name="Shape 87"/>
+          <p:cNvPr id="73" name="Shape 73"/>
           <p:cNvSpPr/>
           <p:nvPr>
             <p:ph idx="2" type="sldImg"/>
@@ -1181,7 +1183,7 @@
       </p:sp>
       <p:sp>
         <p:nvSpPr>
-          <p:cNvPr id="88" name="Shape 88"/>
+          <p:cNvPr id="74" name="Shape 74"/>
           <p:cNvSpPr txBox="1"/>
           <p:nvPr>
             <p:ph idx="1" type="body"/>
@@ -1223,12 +1225,12 @@
 </p:notes>
 </file>
 
-<file path=ppt/notesSlides/notesSlide9.xml><?xml version="1.0" encoding="utf-8"?>
+<file path=ppt/notesSlides/notesSlide7.xml><?xml version="1.0" encoding="utf-8"?>
 <p:notes xmlns:a="http://schemas.openxmlformats.org/drawingml/2006/main" xmlns:r="http://schemas.openxmlformats.org/officeDocument/2006/relationships" xmlns:mc="http://schemas.openxmlformats.org/markup-compatibility/2006" xmlns:mv="urn:schemas-microsoft-com:mac:vml" xmlns:p="http://schemas.openxmlformats.org/presentationml/2006/main" xmlns:c="http://schemas.openxmlformats.org/drawingml/2006/chart" xmlns:dgm="http://schemas.openxmlformats.org/drawingml/2006/diagram" xmlns:o="urn:schemas-microsoft-com:office:office" xmlns:v="urn:schemas-microsoft-com:vml" xmlns:pvml="urn:schemas-microsoft-com:office:powerpoint" xmlns:com="http://schemas.openxmlformats.org/drawingml/2006/compatibility" xmlns:p14="http://schemas.microsoft.com/office/powerpoint/2010/main" showMasterPhAnim="0" showMasterSp="0">
   <p:cSld>
     <p:spTree>
       <p:nvGrpSpPr>
-        <p:cNvPr id="92" name="Shape 92"/>
+        <p:cNvPr id="78" name="Shape 78"/>
         <p:cNvGrpSpPr/>
         <p:nvPr/>
       </p:nvGrpSpPr>
@@ -1242,7 +1244,7 @@
       </p:grpSpPr>
       <p:sp>
         <p:nvSpPr>
-          <p:cNvPr id="93" name="Shape 93"/>
+          <p:cNvPr id="79" name="Shape 79"/>
           <p:cNvSpPr/>
           <p:nvPr>
             <p:ph idx="2" type="sldImg"/>
@@ -1286,7 +1288,217 @@
       </p:sp>
       <p:sp>
         <p:nvSpPr>
-          <p:cNvPr id="94" name="Shape 94"/>
+          <p:cNvPr id="80" name="Shape 80"/>
+          <p:cNvSpPr txBox="1"/>
+          <p:nvPr>
+            <p:ph idx="1" type="body"/>
+          </p:nvPr>
+        </p:nvSpPr>
+        <p:spPr>
+          <a:xfrm>
+            <a:off x="685800" y="4343400"/>
+            <a:ext cx="5486399" cy="4114800"/>
+          </a:xfrm>
+          <a:prstGeom prst="rect">
+            <a:avLst/>
+          </a:prstGeom>
+        </p:spPr>
+        <p:txBody>
+          <a:bodyPr anchorCtr="0" anchor="t" bIns="91425" lIns="91425" rIns="91425" tIns="91425">
+            <a:noAutofit/>
+          </a:bodyPr>
+          <a:lstStyle/>
+          <a:p>
+            <a:pPr>
+              <a:spcBef>
+                <a:spcPts val="0"/>
+              </a:spcBef>
+              <a:buNone/>
+            </a:pPr>
+            <a:r>
+              <a:t/>
+            </a:r>
+            <a:endParaRPr/>
+          </a:p>
+        </p:txBody>
+      </p:sp>
+    </p:spTree>
+  </p:cSld>
+  <p:clrMapOvr>
+    <a:masterClrMapping/>
+  </p:clrMapOvr>
+</p:notes>
+</file>
+
+<file path=ppt/notesSlides/notesSlide8.xml><?xml version="1.0" encoding="utf-8"?>
+<p:notes xmlns:a="http://schemas.openxmlformats.org/drawingml/2006/main" xmlns:r="http://schemas.openxmlformats.org/officeDocument/2006/relationships" xmlns:mc="http://schemas.openxmlformats.org/markup-compatibility/2006" xmlns:mv="urn:schemas-microsoft-com:mac:vml" xmlns:p="http://schemas.openxmlformats.org/presentationml/2006/main" xmlns:c="http://schemas.openxmlformats.org/drawingml/2006/chart" xmlns:dgm="http://schemas.openxmlformats.org/drawingml/2006/diagram" xmlns:o="urn:schemas-microsoft-com:office:office" xmlns:v="urn:schemas-microsoft-com:vml" xmlns:pvml="urn:schemas-microsoft-com:office:powerpoint" xmlns:com="http://schemas.openxmlformats.org/drawingml/2006/compatibility" xmlns:p14="http://schemas.microsoft.com/office/powerpoint/2010/main" showMasterPhAnim="0" showMasterSp="0">
+  <p:cSld>
+    <p:spTree>
+      <p:nvGrpSpPr>
+        <p:cNvPr id="84" name="Shape 84"/>
+        <p:cNvGrpSpPr/>
+        <p:nvPr/>
+      </p:nvGrpSpPr>
+      <p:grpSpPr>
+        <a:xfrm>
+          <a:off x="0" y="0"/>
+          <a:ext cx="0" cy="0"/>
+          <a:chOff x="0" y="0"/>
+          <a:chExt cx="0" cy="0"/>
+        </a:xfrm>
+      </p:grpSpPr>
+      <p:sp>
+        <p:nvSpPr>
+          <p:cNvPr id="85" name="Shape 85"/>
+          <p:cNvSpPr/>
+          <p:nvPr>
+            <p:ph idx="2" type="sldImg"/>
+          </p:nvPr>
+        </p:nvSpPr>
+        <p:spPr>
+          <a:xfrm>
+            <a:off x="381187" y="685800"/>
+            <a:ext cx="6096299" cy="3429000"/>
+          </a:xfrm>
+          <a:custGeom>
+            <a:pathLst>
+              <a:path extrusionOk="0" h="120000" w="120000">
+                <a:moveTo>
+                  <a:pt x="0" y="0"/>
+                </a:moveTo>
+                <a:lnTo>
+                  <a:pt x="120000" y="0"/>
+                </a:lnTo>
+                <a:lnTo>
+                  <a:pt x="120000" y="120000"/>
+                </a:lnTo>
+                <a:lnTo>
+                  <a:pt x="0" y="120000"/>
+                </a:lnTo>
+                <a:close/>
+              </a:path>
+            </a:pathLst>
+          </a:custGeom>
+          <a:noFill/>
+          <a:ln cap="flat" w="9525">
+            <a:solidFill>
+              <a:srgbClr val="000000"/>
+            </a:solidFill>
+            <a:prstDash val="solid"/>
+            <a:round/>
+            <a:headEnd len="med" w="med" type="none"/>
+            <a:tailEnd len="med" w="med" type="none"/>
+          </a:ln>
+        </p:spPr>
+      </p:sp>
+      <p:sp>
+        <p:nvSpPr>
+          <p:cNvPr id="86" name="Shape 86"/>
+          <p:cNvSpPr txBox="1"/>
+          <p:nvPr>
+            <p:ph idx="1" type="body"/>
+          </p:nvPr>
+        </p:nvSpPr>
+        <p:spPr>
+          <a:xfrm>
+            <a:off x="685800" y="4343400"/>
+            <a:ext cx="5486399" cy="4114800"/>
+          </a:xfrm>
+          <a:prstGeom prst="rect">
+            <a:avLst/>
+          </a:prstGeom>
+        </p:spPr>
+        <p:txBody>
+          <a:bodyPr anchorCtr="0" anchor="t" bIns="91425" lIns="91425" rIns="91425" tIns="91425">
+            <a:noAutofit/>
+          </a:bodyPr>
+          <a:lstStyle/>
+          <a:p>
+            <a:pPr>
+              <a:spcBef>
+                <a:spcPts val="0"/>
+              </a:spcBef>
+              <a:buNone/>
+            </a:pPr>
+            <a:r>
+              <a:t/>
+            </a:r>
+            <a:endParaRPr/>
+          </a:p>
+        </p:txBody>
+      </p:sp>
+    </p:spTree>
+  </p:cSld>
+  <p:clrMapOvr>
+    <a:masterClrMapping/>
+  </p:clrMapOvr>
+</p:notes>
+</file>
+
+<file path=ppt/notesSlides/notesSlide9.xml><?xml version="1.0" encoding="utf-8"?>
+<p:notes xmlns:a="http://schemas.openxmlformats.org/drawingml/2006/main" xmlns:r="http://schemas.openxmlformats.org/officeDocument/2006/relationships" xmlns:mc="http://schemas.openxmlformats.org/markup-compatibility/2006" xmlns:mv="urn:schemas-microsoft-com:mac:vml" xmlns:p="http://schemas.openxmlformats.org/presentationml/2006/main" xmlns:c="http://schemas.openxmlformats.org/drawingml/2006/chart" xmlns:dgm="http://schemas.openxmlformats.org/drawingml/2006/diagram" xmlns:o="urn:schemas-microsoft-com:office:office" xmlns:v="urn:schemas-microsoft-com:vml" xmlns:pvml="urn:schemas-microsoft-com:office:powerpoint" xmlns:com="http://schemas.openxmlformats.org/drawingml/2006/compatibility" xmlns:p14="http://schemas.microsoft.com/office/powerpoint/2010/main" showMasterPhAnim="0" showMasterSp="0">
+  <p:cSld>
+    <p:spTree>
+      <p:nvGrpSpPr>
+        <p:cNvPr id="90" name="Shape 90"/>
+        <p:cNvGrpSpPr/>
+        <p:nvPr/>
+      </p:nvGrpSpPr>
+      <p:grpSpPr>
+        <a:xfrm>
+          <a:off x="0" y="0"/>
+          <a:ext cx="0" cy="0"/>
+          <a:chOff x="0" y="0"/>
+          <a:chExt cx="0" cy="0"/>
+        </a:xfrm>
+      </p:grpSpPr>
+      <p:sp>
+        <p:nvSpPr>
+          <p:cNvPr id="91" name="Shape 91"/>
+          <p:cNvSpPr/>
+          <p:nvPr>
+            <p:ph idx="2" type="sldImg"/>
+          </p:nvPr>
+        </p:nvSpPr>
+        <p:spPr>
+          <a:xfrm>
+            <a:off x="381187" y="685800"/>
+            <a:ext cx="6096299" cy="3429000"/>
+          </a:xfrm>
+          <a:custGeom>
+            <a:pathLst>
+              <a:path extrusionOk="0" h="120000" w="120000">
+                <a:moveTo>
+                  <a:pt x="0" y="0"/>
+                </a:moveTo>
+                <a:lnTo>
+                  <a:pt x="120000" y="0"/>
+                </a:lnTo>
+                <a:lnTo>
+                  <a:pt x="120000" y="120000"/>
+                </a:lnTo>
+                <a:lnTo>
+                  <a:pt x="0" y="120000"/>
+                </a:lnTo>
+                <a:close/>
+              </a:path>
+            </a:pathLst>
+          </a:custGeom>
+          <a:noFill/>
+          <a:ln cap="flat" w="9525">
+            <a:solidFill>
+              <a:srgbClr val="000000"/>
+            </a:solidFill>
+            <a:prstDash val="solid"/>
+            <a:round/>
+            <a:headEnd len="med" w="med" type="none"/>
+            <a:tailEnd len="med" w="med" type="none"/>
+          </a:ln>
+        </p:spPr>
+      </p:sp>
+      <p:sp>
+        <p:nvSpPr>
+          <p:cNvPr id="92" name="Shape 92"/>
           <p:cNvSpPr txBox="1"/>
           <p:nvPr>
             <p:ph idx="1" type="body"/>
@@ -3762,6 +3974,299 @@
 </p:sld>
 </file>
 
+<file path=ppt/slides/slide10.xml><?xml version="1.0" encoding="utf-8"?>
+<p:sld xmlns:a="http://schemas.openxmlformats.org/drawingml/2006/main" xmlns:r="http://schemas.openxmlformats.org/officeDocument/2006/relationships" xmlns:mc="http://schemas.openxmlformats.org/markup-compatibility/2006" xmlns:mv="urn:schemas-microsoft-com:mac:vml" xmlns:p="http://schemas.openxmlformats.org/presentationml/2006/main" xmlns:c="http://schemas.openxmlformats.org/drawingml/2006/chart" xmlns:dgm="http://schemas.openxmlformats.org/drawingml/2006/diagram" xmlns:o="urn:schemas-microsoft-com:office:office" xmlns:v="urn:schemas-microsoft-com:vml" xmlns:pvml="urn:schemas-microsoft-com:office:powerpoint" xmlns:com="http://schemas.openxmlformats.org/drawingml/2006/compatibility" xmlns:p14="http://schemas.microsoft.com/office/powerpoint/2010/main">
+  <p:cSld>
+    <p:spTree>
+      <p:nvGrpSpPr>
+        <p:cNvPr id="93" name="Shape 93"/>
+        <p:cNvGrpSpPr/>
+        <p:nvPr/>
+      </p:nvGrpSpPr>
+      <p:grpSpPr>
+        <a:xfrm>
+          <a:off x="0" y="0"/>
+          <a:ext cx="0" cy="0"/>
+          <a:chOff x="0" y="0"/>
+          <a:chExt cx="0" cy="0"/>
+        </a:xfrm>
+      </p:grpSpPr>
+      <p:sp>
+        <p:nvSpPr>
+          <p:cNvPr id="94" name="Shape 94"/>
+          <p:cNvSpPr txBox="1"/>
+          <p:nvPr>
+            <p:ph type="title"/>
+          </p:nvPr>
+        </p:nvSpPr>
+        <p:spPr>
+          <a:xfrm>
+            <a:off x="457200" y="205977"/>
+            <a:ext cx="8229600" cy="1141499"/>
+          </a:xfrm>
+          <a:prstGeom prst="rect">
+            <a:avLst/>
+          </a:prstGeom>
+        </p:spPr>
+        <p:txBody>
+          <a:bodyPr anchorCtr="0" anchor="b" bIns="91425" lIns="91425" rIns="91425" tIns="91425">
+            <a:noAutofit/>
+          </a:bodyPr>
+          <a:lstStyle/>
+          <a:p>
+            <a:pPr>
+              <a:spcBef>
+                <a:spcPts val="0"/>
+              </a:spcBef>
+              <a:buNone/>
+            </a:pPr>
+            <a:r>
+              <a:rPr lang="pt-BR"/>
+              <a:t>Arte Conceitual</a:t>
+            </a:r>
+          </a:p>
+        </p:txBody>
+      </p:sp>
+      <p:sp>
+        <p:nvSpPr>
+          <p:cNvPr id="95" name="Shape 95"/>
+          <p:cNvSpPr txBox="1"/>
+          <p:nvPr>
+            <p:ph idx="1" type="body"/>
+          </p:nvPr>
+        </p:nvSpPr>
+        <p:spPr>
+          <a:xfrm>
+            <a:off x="457200" y="1460499"/>
+            <a:ext cx="4030200" cy="3465299"/>
+          </a:xfrm>
+          <a:prstGeom prst="rect">
+            <a:avLst/>
+          </a:prstGeom>
+        </p:spPr>
+        <p:txBody>
+          <a:bodyPr anchorCtr="0" anchor="t" bIns="91425" lIns="91425" rIns="91425" tIns="91425">
+            <a:noAutofit/>
+          </a:bodyPr>
+          <a:lstStyle/>
+          <a:p>
+            <a:pPr indent="-419100" lvl="0" marL="457200">
+              <a:spcBef>
+                <a:spcPts val="0"/>
+              </a:spcBef>
+              <a:buClr>
+                <a:schemeClr val="dk2"/>
+              </a:buClr>
+              <a:buSzPct val="100000"/>
+              <a:buFont typeface="Arial"/>
+              <a:buChar char="●"/>
+            </a:pPr>
+            <a:r>
+              <a:rPr lang="pt-BR"/>
+              <a:t>Patrícia</a:t>
+            </a:r>
+          </a:p>
+        </p:txBody>
+      </p:sp>
+      <p:pic>
+        <p:nvPicPr>
+          <p:cNvPr id="96" name="Shape 96"/>
+          <p:cNvPicPr preferRelativeResize="0"/>
+          <p:nvPr/>
+        </p:nvPicPr>
+        <p:blipFill>
+          <a:blip r:embed="rId3">
+            <a:alphaModFix/>
+          </a:blip>
+          <a:stretch>
+            <a:fillRect/>
+          </a:stretch>
+        </p:blipFill>
+        <p:spPr>
+          <a:xfrm>
+            <a:off x="5535351" y="1460500"/>
+            <a:ext cx="2165820" cy="3465299"/>
+          </a:xfrm>
+          <a:prstGeom prst="rect">
+            <a:avLst/>
+          </a:prstGeom>
+          <a:noFill/>
+          <a:ln>
+            <a:noFill/>
+          </a:ln>
+        </p:spPr>
+      </p:pic>
+      <p:sp>
+        <p:nvSpPr>
+          <p:cNvPr id="97" name="Shape 97"/>
+          <p:cNvSpPr txBox="1"/>
+          <p:nvPr>
+            <p:ph idx="2" type="body"/>
+          </p:nvPr>
+        </p:nvSpPr>
+        <p:spPr>
+          <a:xfrm>
+            <a:off x="4656667" y="1461908"/>
+            <a:ext cx="4030200" cy="3465299"/>
+          </a:xfrm>
+          <a:prstGeom prst="rect">
+            <a:avLst/>
+          </a:prstGeom>
+        </p:spPr>
+        <p:txBody>
+          <a:bodyPr anchorCtr="0" anchor="t" bIns="91425" lIns="91425" rIns="91425" tIns="91425">
+            <a:noAutofit/>
+          </a:bodyPr>
+          <a:lstStyle/>
+          <a:p>
+            <a:pPr>
+              <a:spcBef>
+                <a:spcPts val="0"/>
+              </a:spcBef>
+              <a:buNone/>
+            </a:pPr>
+            <a:r>
+              <a:t/>
+            </a:r>
+            <a:endParaRPr/>
+          </a:p>
+        </p:txBody>
+      </p:sp>
+    </p:spTree>
+  </p:cSld>
+  <p:clrMapOvr>
+    <a:masterClrMapping/>
+  </p:clrMapOvr>
+  <p:transition spd="slow">
+    <p:cut/>
+  </p:transition>
+</p:sld>
+</file>
+
+<file path=ppt/slides/slide11.xml><?xml version="1.0" encoding="utf-8"?>
+<p:sld xmlns:a="http://schemas.openxmlformats.org/drawingml/2006/main" xmlns:r="http://schemas.openxmlformats.org/officeDocument/2006/relationships" xmlns:mc="http://schemas.openxmlformats.org/markup-compatibility/2006" xmlns:mv="urn:schemas-microsoft-com:mac:vml" xmlns:p="http://schemas.openxmlformats.org/presentationml/2006/main" xmlns:c="http://schemas.openxmlformats.org/drawingml/2006/chart" xmlns:dgm="http://schemas.openxmlformats.org/drawingml/2006/diagram" xmlns:o="urn:schemas-microsoft-com:office:office" xmlns:v="urn:schemas-microsoft-com:vml" xmlns:pvml="urn:schemas-microsoft-com:office:powerpoint" xmlns:com="http://schemas.openxmlformats.org/drawingml/2006/compatibility" xmlns:p14="http://schemas.microsoft.com/office/powerpoint/2010/main">
+  <p:cSld>
+    <p:spTree>
+      <p:nvGrpSpPr>
+        <p:cNvPr id="101" name="Shape 101"/>
+        <p:cNvGrpSpPr/>
+        <p:nvPr/>
+      </p:nvGrpSpPr>
+      <p:grpSpPr>
+        <a:xfrm>
+          <a:off x="0" y="0"/>
+          <a:ext cx="0" cy="0"/>
+          <a:chOff x="0" y="0"/>
+          <a:chExt cx="0" cy="0"/>
+        </a:xfrm>
+      </p:grpSpPr>
+      <p:sp>
+        <p:nvSpPr>
+          <p:cNvPr id="102" name="Shape 102"/>
+          <p:cNvSpPr txBox="1"/>
+          <p:nvPr>
+            <p:ph type="title"/>
+          </p:nvPr>
+        </p:nvSpPr>
+        <p:spPr>
+          <a:xfrm>
+            <a:off x="457200" y="205977"/>
+            <a:ext cx="8229600" cy="1141499"/>
+          </a:xfrm>
+          <a:prstGeom prst="rect">
+            <a:avLst/>
+          </a:prstGeom>
+        </p:spPr>
+        <p:txBody>
+          <a:bodyPr anchorCtr="0" anchor="b" bIns="91425" lIns="91425" rIns="91425" tIns="91425">
+            <a:noAutofit/>
+          </a:bodyPr>
+          <a:lstStyle/>
+          <a:p>
+            <a:pPr>
+              <a:spcBef>
+                <a:spcPts val="0"/>
+              </a:spcBef>
+              <a:buNone/>
+            </a:pPr>
+            <a:r>
+              <a:rPr lang="pt-BR"/>
+              <a:t>Conclusão</a:t>
+            </a:r>
+          </a:p>
+        </p:txBody>
+      </p:sp>
+      <p:sp>
+        <p:nvSpPr>
+          <p:cNvPr id="103" name="Shape 103"/>
+          <p:cNvSpPr txBox="1"/>
+          <p:nvPr>
+            <p:ph idx="1" type="body"/>
+          </p:nvPr>
+        </p:nvSpPr>
+        <p:spPr>
+          <a:xfrm>
+            <a:off x="457200" y="1460499"/>
+            <a:ext cx="8229600" cy="3465299"/>
+          </a:xfrm>
+          <a:prstGeom prst="rect">
+            <a:avLst/>
+          </a:prstGeom>
+        </p:spPr>
+        <p:txBody>
+          <a:bodyPr anchorCtr="0" anchor="t" bIns="91425" lIns="91425" rIns="91425" tIns="91425">
+            <a:noAutofit/>
+          </a:bodyPr>
+          <a:lstStyle/>
+          <a:p>
+            <a:pPr rtl="0" algn="ctr">
+              <a:spcBef>
+                <a:spcPts val="0"/>
+              </a:spcBef>
+              <a:buNone/>
+            </a:pPr>
+            <a:r>
+              <a:t/>
+            </a:r>
+            <a:endParaRPr/>
+          </a:p>
+          <a:p>
+            <a:pPr rtl="0" algn="ctr">
+              <a:spcBef>
+                <a:spcPts val="0"/>
+              </a:spcBef>
+              <a:buNone/>
+            </a:pPr>
+            <a:r>
+              <a:t/>
+            </a:r>
+            <a:endParaRPr/>
+          </a:p>
+          <a:p>
+            <a:pPr lvl="0" algn="ctr">
+              <a:spcBef>
+                <a:spcPts val="0"/>
+              </a:spcBef>
+              <a:buNone/>
+            </a:pPr>
+            <a:r>
+              <a:rPr lang="pt-BR"/>
+              <a:t>Perguntas?</a:t>
+            </a:r>
+          </a:p>
+        </p:txBody>
+      </p:sp>
+    </p:spTree>
+  </p:cSld>
+  <p:clrMapOvr>
+    <a:masterClrMapping/>
+  </p:clrMapOvr>
+  <p:transition spd="slow">
+    <p:cut/>
+  </p:transition>
+</p:sld>
+</file>
+
 <file path=ppt/slides/slide2.xml><?xml version="1.0" encoding="utf-8"?>
 <p:sld xmlns:a="http://schemas.openxmlformats.org/drawingml/2006/main" xmlns:r="http://schemas.openxmlformats.org/officeDocument/2006/relationships" xmlns:mc="http://schemas.openxmlformats.org/markup-compatibility/2006" xmlns:mv="urn:schemas-microsoft-com:mac:vml" xmlns:p="http://schemas.openxmlformats.org/presentationml/2006/main" xmlns:c="http://schemas.openxmlformats.org/drawingml/2006/chart" xmlns:dgm="http://schemas.openxmlformats.org/drawingml/2006/diagram" xmlns:o="urn:schemas-microsoft-com:office:office" xmlns:v="urn:schemas-microsoft-com:vml" xmlns:pvml="urn:schemas-microsoft-com:office:powerpoint" xmlns:com="http://schemas.openxmlformats.org/drawingml/2006/compatibility" xmlns:p14="http://schemas.microsoft.com/office/powerpoint/2010/main">
   <p:cSld>
@@ -4775,7 +5280,7 @@
             </a:pPr>
             <a:r>
               <a:rPr lang="pt-BR"/>
-              <a:t>Extra: OST em 8 bits!</a:t>
+              <a:t>Execução</a:t>
             </a:r>
           </a:p>
         </p:txBody>
@@ -4816,7 +5321,41 @@
             </a:pPr>
             <a:r>
               <a:rPr lang="pt-BR"/>
-              <a:t>Kraftwerk</a:t>
+              <a:t>No Windows (No diretório “Install”)</a:t>
+            </a:r>
+          </a:p>
+          <a:p>
+            <a:pPr indent="-381000" lvl="1" marL="914400" rtl="0">
+              <a:spcBef>
+                <a:spcPts val="0"/>
+              </a:spcBef>
+              <a:buClr>
+                <a:schemeClr val="dk2"/>
+              </a:buClr>
+              <a:buSzPct val="80000"/>
+              <a:buFont typeface="Courier New"/>
+              <a:buChar char="o"/>
+            </a:pPr>
+            <a:r>
+              <a:rPr lang="pt-BR"/>
+              <a:t>Python 2</a:t>
+            </a:r>
+          </a:p>
+          <a:p>
+            <a:pPr indent="-381000" lvl="1" marL="914400" rtl="0">
+              <a:spcBef>
+                <a:spcPts val="0"/>
+              </a:spcBef>
+              <a:buClr>
+                <a:schemeClr val="dk2"/>
+              </a:buClr>
+              <a:buSzPct val="80000"/>
+              <a:buFont typeface="Courier New"/>
+              <a:buChar char="o"/>
+            </a:pPr>
+            <a:r>
+              <a:rPr lang="pt-BR"/>
+              <a:t>Pygame</a:t>
             </a:r>
           </a:p>
           <a:p>
@@ -4833,7 +5372,41 @@
             </a:pPr>
             <a:r>
               <a:rPr lang="pt-BR"/>
-              <a:t>Daft Punk</a:t>
+              <a:t>No Linux</a:t>
+            </a:r>
+          </a:p>
+          <a:p>
+            <a:pPr indent="-381000" lvl="1" marL="914400" rtl="0">
+              <a:spcBef>
+                <a:spcPts val="0"/>
+              </a:spcBef>
+              <a:buClr>
+                <a:schemeClr val="dk2"/>
+              </a:buClr>
+              <a:buSzPct val="80000"/>
+              <a:buFont typeface="Courier New"/>
+              <a:buChar char="o"/>
+            </a:pPr>
+            <a:r>
+              <a:rPr lang="pt-BR"/>
+              <a:t>Pygame</a:t>
+            </a:r>
+          </a:p>
+          <a:p>
+            <a:pPr indent="-381000" lvl="2" marL="1371600" rtl="0">
+              <a:spcBef>
+                <a:spcPts val="0"/>
+              </a:spcBef>
+              <a:buClr>
+                <a:schemeClr val="dk2"/>
+              </a:buClr>
+              <a:buSzPct val="80000"/>
+              <a:buFont typeface="Wingdings"/>
+              <a:buChar char="§"/>
+            </a:pPr>
+            <a:r>
+              <a:rPr lang="pt-BR"/>
+              <a:t>sudo apt-get install python-pygame</a:t>
             </a:r>
           </a:p>
           <a:p>
@@ -4850,41 +5423,24 @@
             </a:pPr>
             <a:r>
               <a:rPr lang="pt-BR"/>
-              <a:t>The Cure</a:t>
-            </a:r>
-          </a:p>
-          <a:p>
-            <a:pPr indent="-419100" lvl="0" marL="457200" rtl="0">
+              <a:t>Em ambos</a:t>
+            </a:r>
+          </a:p>
+          <a:p>
+            <a:pPr indent="-381000" lvl="1" marL="914400">
               <a:spcBef>
                 <a:spcPts val="0"/>
               </a:spcBef>
               <a:buClr>
                 <a:schemeClr val="dk2"/>
               </a:buClr>
-              <a:buSzPct val="100000"/>
-              <a:buFont typeface="Arial"/>
-              <a:buChar char="●"/>
+              <a:buSzPct val="80000"/>
+              <a:buFont typeface="Courier New"/>
+              <a:buChar char="o"/>
             </a:pPr>
             <a:r>
               <a:rPr lang="pt-BR"/>
-              <a:t>New Order</a:t>
-            </a:r>
-          </a:p>
-          <a:p>
-            <a:pPr indent="-419100" lvl="0" marL="457200" rtl="0">
-              <a:spcBef>
-                <a:spcPts val="0"/>
-              </a:spcBef>
-              <a:buClr>
-                <a:schemeClr val="dk2"/>
-              </a:buClr>
-              <a:buSzPct val="100000"/>
-              <a:buFont typeface="Arial"/>
-              <a:buChar char="●"/>
-            </a:pPr>
-            <a:r>
-              <a:rPr lang="pt-BR"/>
-              <a:t>Pink Floyd</a:t>
+              <a:t>Fonte Computer Pixel-7 (No diretório “Fonte”)</a:t>
             </a:r>
           </a:p>
         </p:txBody>
@@ -4948,7 +5504,7 @@
             </a:pPr>
             <a:r>
               <a:rPr lang="pt-BR"/>
-              <a:t>Arte Conceitual</a:t>
+              <a:t>Execução</a:t>
             </a:r>
           </a:p>
         </p:txBody>
@@ -4964,7 +5520,7 @@
         <p:spPr>
           <a:xfrm>
             <a:off x="457200" y="1460499"/>
-            <a:ext cx="4030200" cy="3465299"/>
+            <a:ext cx="8229600" cy="3465299"/>
           </a:xfrm>
           <a:prstGeom prst="rect">
             <a:avLst/>
@@ -4976,7 +5532,7 @@
           </a:bodyPr>
           <a:lstStyle/>
           <a:p>
-            <a:pPr indent="-419100" lvl="0" marL="457200">
+            <a:pPr indent="-419100" lvl="0" marL="457200" rtl="0">
               <a:spcBef>
                 <a:spcPts val="0"/>
               </a:spcBef>
@@ -4989,72 +5545,25 @@
             </a:pPr>
             <a:r>
               <a:rPr lang="pt-BR"/>
-              <a:t>Patrícia</a:t>
-            </a:r>
-          </a:p>
-        </p:txBody>
-      </p:sp>
-      <p:pic>
-        <p:nvPicPr>
-          <p:cNvPr id="84" name="Shape 84"/>
-          <p:cNvPicPr preferRelativeResize="0"/>
-          <p:nvPr/>
-        </p:nvPicPr>
-        <p:blipFill>
-          <a:blip r:embed="rId3">
-            <a:alphaModFix/>
-          </a:blip>
-          <a:stretch>
-            <a:fillRect/>
-          </a:stretch>
-        </p:blipFill>
-        <p:spPr>
-          <a:xfrm>
-            <a:off x="5535351" y="1460500"/>
-            <a:ext cx="2165820" cy="3465299"/>
-          </a:xfrm>
-          <a:prstGeom prst="rect">
-            <a:avLst/>
-          </a:prstGeom>
-          <a:noFill/>
-          <a:ln>
-            <a:noFill/>
-          </a:ln>
-        </p:spPr>
-      </p:pic>
-      <p:sp>
-        <p:nvSpPr>
-          <p:cNvPr id="85" name="Shape 85"/>
-          <p:cNvSpPr txBox="1"/>
-          <p:nvPr>
-            <p:ph idx="2" type="body"/>
-          </p:nvPr>
-        </p:nvSpPr>
-        <p:spPr>
-          <a:xfrm>
-            <a:off x="4656667" y="1461908"/>
-            <a:ext cx="4030200" cy="3465299"/>
-          </a:xfrm>
-          <a:prstGeom prst="rect">
-            <a:avLst/>
-          </a:prstGeom>
-        </p:spPr>
-        <p:txBody>
-          <a:bodyPr anchorCtr="0" anchor="t" bIns="91425" lIns="91425" rIns="91425" tIns="91425">
-            <a:noAutofit/>
-          </a:bodyPr>
-          <a:lstStyle/>
-          <a:p>
-            <a:pPr>
-              <a:spcBef>
-                <a:spcPts val="0"/>
-              </a:spcBef>
-              <a:buNone/>
-            </a:pPr>
-            <a:r>
-              <a:t/>
-            </a:r>
-            <a:endParaRPr/>
+              <a:t>No terminal (ou prompt de comando):</a:t>
+            </a:r>
+          </a:p>
+          <a:p>
+            <a:pPr indent="-381000" lvl="1" marL="914400">
+              <a:spcBef>
+                <a:spcPts val="0"/>
+              </a:spcBef>
+              <a:buClr>
+                <a:schemeClr val="dk2"/>
+              </a:buClr>
+              <a:buSzPct val="80000"/>
+              <a:buFont typeface="Courier New"/>
+              <a:buChar char="o"/>
+            </a:pPr>
+            <a:r>
+              <a:rPr lang="pt-BR"/>
+              <a:t>python main2.py</a:t>
+            </a:r>
           </a:p>
         </p:txBody>
       </p:sp>
@@ -5074,7 +5583,7 @@
   <p:cSld>
     <p:spTree>
       <p:nvGrpSpPr>
-        <p:cNvPr id="89" name="Shape 89"/>
+        <p:cNvPr id="87" name="Shape 87"/>
         <p:cNvGrpSpPr/>
         <p:nvPr/>
       </p:nvGrpSpPr>
@@ -5088,7 +5597,7 @@
       </p:grpSpPr>
       <p:sp>
         <p:nvSpPr>
-          <p:cNvPr id="90" name="Shape 90"/>
+          <p:cNvPr id="88" name="Shape 88"/>
           <p:cNvSpPr txBox="1"/>
           <p:nvPr>
             <p:ph type="title"/>
@@ -5117,14 +5626,14 @@
             </a:pPr>
             <a:r>
               <a:rPr lang="pt-BR"/>
-              <a:t>Conclusão</a:t>
+              <a:t>Extra: OST em 8 bits!</a:t>
             </a:r>
           </a:p>
         </p:txBody>
       </p:sp>
       <p:sp>
         <p:nvSpPr>
-          <p:cNvPr id="91" name="Shape 91"/>
+          <p:cNvPr id="89" name="Shape 89"/>
           <p:cNvSpPr txBox="1"/>
           <p:nvPr>
             <p:ph idx="1" type="body"/>
@@ -5145,39 +5654,88 @@
           </a:bodyPr>
           <a:lstStyle/>
           <a:p>
-            <a:pPr rtl="0" algn="ctr">
-              <a:spcBef>
-                <a:spcPts val="0"/>
-              </a:spcBef>
-              <a:buNone/>
-            </a:pPr>
-            <a:r>
-              <a:t/>
-            </a:r>
-            <a:endParaRPr/>
-          </a:p>
-          <a:p>
-            <a:pPr rtl="0" algn="ctr">
-              <a:spcBef>
-                <a:spcPts val="0"/>
-              </a:spcBef>
-              <a:buNone/>
-            </a:pPr>
-            <a:r>
-              <a:t/>
-            </a:r>
-            <a:endParaRPr/>
-          </a:p>
-          <a:p>
-            <a:pPr lvl="0" algn="ctr">
-              <a:spcBef>
-                <a:spcPts val="0"/>
-              </a:spcBef>
-              <a:buNone/>
+            <a:pPr indent="-419100" lvl="0" marL="457200" rtl="0">
+              <a:spcBef>
+                <a:spcPts val="0"/>
+              </a:spcBef>
+              <a:buClr>
+                <a:schemeClr val="dk2"/>
+              </a:buClr>
+              <a:buSzPct val="100000"/>
+              <a:buFont typeface="Arial"/>
+              <a:buChar char="●"/>
             </a:pPr>
             <a:r>
               <a:rPr lang="pt-BR"/>
-              <a:t>Perguntas?</a:t>
+              <a:t>Kraftwerk</a:t>
+            </a:r>
+          </a:p>
+          <a:p>
+            <a:pPr indent="-419100" lvl="0" marL="457200" rtl="0">
+              <a:spcBef>
+                <a:spcPts val="0"/>
+              </a:spcBef>
+              <a:buClr>
+                <a:schemeClr val="dk2"/>
+              </a:buClr>
+              <a:buSzPct val="100000"/>
+              <a:buFont typeface="Arial"/>
+              <a:buChar char="●"/>
+            </a:pPr>
+            <a:r>
+              <a:rPr lang="pt-BR"/>
+              <a:t>Daft Punk</a:t>
+            </a:r>
+          </a:p>
+          <a:p>
+            <a:pPr indent="-419100" lvl="0" marL="457200" rtl="0">
+              <a:spcBef>
+                <a:spcPts val="0"/>
+              </a:spcBef>
+              <a:buClr>
+                <a:schemeClr val="dk2"/>
+              </a:buClr>
+              <a:buSzPct val="100000"/>
+              <a:buFont typeface="Arial"/>
+              <a:buChar char="●"/>
+            </a:pPr>
+            <a:r>
+              <a:rPr lang="pt-BR"/>
+              <a:t>The Cure</a:t>
+            </a:r>
+          </a:p>
+          <a:p>
+            <a:pPr indent="-419100" lvl="0" marL="457200" rtl="0">
+              <a:spcBef>
+                <a:spcPts val="0"/>
+              </a:spcBef>
+              <a:buClr>
+                <a:schemeClr val="dk2"/>
+              </a:buClr>
+              <a:buSzPct val="100000"/>
+              <a:buFont typeface="Arial"/>
+              <a:buChar char="●"/>
+            </a:pPr>
+            <a:r>
+              <a:rPr lang="pt-BR"/>
+              <a:t>New Order</a:t>
+            </a:r>
+          </a:p>
+          <a:p>
+            <a:pPr indent="-419100" lvl="0" marL="457200" rtl="0">
+              <a:spcBef>
+                <a:spcPts val="0"/>
+              </a:spcBef>
+              <a:buClr>
+                <a:schemeClr val="dk2"/>
+              </a:buClr>
+              <a:buSzPct val="100000"/>
+              <a:buFont typeface="Arial"/>
+              <a:buChar char="●"/>
+            </a:pPr>
+            <a:r>
+              <a:rPr lang="pt-BR"/>
+              <a:t>Pink Floyd</a:t>
             </a:r>
           </a:p>
         </p:txBody>
@@ -5194,9 +5752,9 @@
 </file>
 
 <file path=ppt/theme/theme1.xml><?xml version="1.0" encoding="utf-8"?>
-<a:theme xmlns:a="http://schemas.openxmlformats.org/drawingml/2006/main" xmlns:r="http://schemas.openxmlformats.org/officeDocument/2006/relationships" name="Custom Theme">
+<a:theme xmlns:a="http://schemas.openxmlformats.org/drawingml/2006/main" xmlns:r="http://schemas.openxmlformats.org/officeDocument/2006/relationships" name="modern">
   <a:themeElements>
-    <a:clrScheme name="Default">
+    <a:clrScheme name="Custom 348">
       <a:dk1>
         <a:srgbClr val="000000"/>
       </a:dk1>
@@ -5204,34 +5762,34 @@
         <a:srgbClr val="FFFFFF"/>
       </a:lt1>
       <a:dk2>
-        <a:srgbClr val="158158"/>
+        <a:srgbClr val="191919"/>
       </a:dk2>
       <a:lt2>
-        <a:srgbClr val="F3F3F3"/>
+        <a:srgbClr val="CCCCCC"/>
       </a:lt2>
       <a:accent1>
-        <a:srgbClr val="058DC7"/>
+        <a:srgbClr val="7E5554"/>
       </a:accent1>
       <a:accent2>
-        <a:srgbClr val="50B432"/>
+        <a:srgbClr val="910A10"/>
       </a:accent2>
       <a:accent3>
-        <a:srgbClr val="ED561B"/>
+        <a:srgbClr val="84294D"/>
       </a:accent3>
       <a:accent4>
-        <a:srgbClr val="EDEF00"/>
+        <a:srgbClr val="DA823B"/>
       </a:accent4>
       <a:accent5>
-        <a:srgbClr val="24CBE5"/>
+        <a:srgbClr val="625D3C"/>
       </a:accent5>
       <a:accent6>
-        <a:srgbClr val="64E572"/>
+        <a:srgbClr val="00384A"/>
       </a:accent6>
       <a:hlink>
-        <a:srgbClr val="2200CC"/>
+        <a:srgbClr val="227A78"/>
       </a:hlink>
       <a:folHlink>
-        <a:srgbClr val="551A8B"/>
+        <a:srgbClr val="394749"/>
       </a:folHlink>
     </a:clrScheme>
     <a:fontScheme name="Office">
@@ -5788,9 +6346,9 @@
 </file>
 
 <file path=ppt/theme/theme3.xml><?xml version="1.0" encoding="utf-8"?>
-<a:theme xmlns:a="http://schemas.openxmlformats.org/drawingml/2006/main" xmlns:r="http://schemas.openxmlformats.org/officeDocument/2006/relationships" name="modern">
+<a:theme xmlns:a="http://schemas.openxmlformats.org/drawingml/2006/main" xmlns:r="http://schemas.openxmlformats.org/officeDocument/2006/relationships" name="Custom Theme">
   <a:themeElements>
-    <a:clrScheme name="Custom 348">
+    <a:clrScheme name="Default">
       <a:dk1>
         <a:srgbClr val="000000"/>
       </a:dk1>
@@ -5798,34 +6356,34 @@
         <a:srgbClr val="FFFFFF"/>
       </a:lt1>
       <a:dk2>
-        <a:srgbClr val="191919"/>
+        <a:srgbClr val="158158"/>
       </a:dk2>
       <a:lt2>
-        <a:srgbClr val="CCCCCC"/>
+        <a:srgbClr val="F3F3F3"/>
       </a:lt2>
       <a:accent1>
-        <a:srgbClr val="7E5554"/>
+        <a:srgbClr val="058DC7"/>
       </a:accent1>
       <a:accent2>
-        <a:srgbClr val="910A10"/>
+        <a:srgbClr val="50B432"/>
       </a:accent2>
       <a:accent3>
-        <a:srgbClr val="84294D"/>
+        <a:srgbClr val="ED561B"/>
       </a:accent3>
       <a:accent4>
-        <a:srgbClr val="DA823B"/>
+        <a:srgbClr val="EDEF00"/>
       </a:accent4>
       <a:accent5>
-        <a:srgbClr val="625D3C"/>
+        <a:srgbClr val="24CBE5"/>
       </a:accent5>
       <a:accent6>
-        <a:srgbClr val="00384A"/>
+        <a:srgbClr val="64E572"/>
       </a:accent6>
       <a:hlink>
-        <a:srgbClr val="227A78"/>
+        <a:srgbClr val="2200CC"/>
       </a:hlink>
       <a:folHlink>
-        <a:srgbClr val="394749"/>
+        <a:srgbClr val="551A8B"/>
       </a:folHlink>
     </a:clrScheme>
     <a:fontScheme name="Office">

</xml_diff>